<commit_message>
end of day commit
</commit_message>
<xml_diff>
--- a/Assignment/Presentation/Web Science Assignment.pptx
+++ b/Assignment/Presentation/Web Science Assignment.pptx
@@ -110,6 +110,11 @@
       </a:defRPr>
     </a:lvl9pPr>
   </p:defaultTextStyle>
+  <p:extLst>
+    <p:ext uri="{EFAFB233-063F-42B5-8137-9DF3F51BA10A}">
+      <p15:sldGuideLst xmlns:p15="http://schemas.microsoft.com/office/powerpoint/2012/main"/>
+    </p:ext>
+  </p:extLst>
 </p:presentation>
 </file>
 
@@ -309,7 +314,7 @@
           <a:p>
             <a:fld id="{F83CE540-5687-412F-83D3-2D1A385E2057}" type="datetimeFigureOut">
               <a:rPr lang="hu-HU" smtClean="0"/>
-              <a:t>2021. 04. 13.</a:t>
+              <a:t>2021. 04. 14.</a:t>
             </a:fld>
             <a:endParaRPr lang="hu-HU"/>
           </a:p>
@@ -590,7 +595,7 @@
           <a:p>
             <a:fld id="{F83CE540-5687-412F-83D3-2D1A385E2057}" type="datetimeFigureOut">
               <a:rPr lang="hu-HU" smtClean="0"/>
-              <a:t>2021. 04. 13.</a:t>
+              <a:t>2021. 04. 14.</a:t>
             </a:fld>
             <a:endParaRPr lang="hu-HU"/>
           </a:p>
@@ -782,7 +787,7 @@
           <a:p>
             <a:fld id="{F83CE540-5687-412F-83D3-2D1A385E2057}" type="datetimeFigureOut">
               <a:rPr lang="hu-HU" smtClean="0"/>
-              <a:t>2021. 04. 13.</a:t>
+              <a:t>2021. 04. 14.</a:t>
             </a:fld>
             <a:endParaRPr lang="hu-HU"/>
           </a:p>
@@ -1043,7 +1048,7 @@
           <a:p>
             <a:fld id="{F83CE540-5687-412F-83D3-2D1A385E2057}" type="datetimeFigureOut">
               <a:rPr lang="hu-HU" smtClean="0"/>
-              <a:t>2021. 04. 13.</a:t>
+              <a:t>2021. 04. 14.</a:t>
             </a:fld>
             <a:endParaRPr lang="hu-HU"/>
           </a:p>
@@ -1469,7 +1474,7 @@
           <a:p>
             <a:fld id="{F83CE540-5687-412F-83D3-2D1A385E2057}" type="datetimeFigureOut">
               <a:rPr lang="hu-HU" smtClean="0"/>
-              <a:t>2021. 04. 13.</a:t>
+              <a:t>2021. 04. 14.</a:t>
             </a:fld>
             <a:endParaRPr lang="hu-HU"/>
           </a:p>
@@ -2015,7 +2020,7 @@
           <a:p>
             <a:fld id="{F83CE540-5687-412F-83D3-2D1A385E2057}" type="datetimeFigureOut">
               <a:rPr lang="hu-HU" smtClean="0"/>
-              <a:t>2021. 04. 13.</a:t>
+              <a:t>2021. 04. 14.</a:t>
             </a:fld>
             <a:endParaRPr lang="hu-HU"/>
           </a:p>
@@ -2846,7 +2851,7 @@
           <a:p>
             <a:fld id="{F83CE540-5687-412F-83D3-2D1A385E2057}" type="datetimeFigureOut">
               <a:rPr lang="hu-HU" smtClean="0"/>
-              <a:t>2021. 04. 13.</a:t>
+              <a:t>2021. 04. 14.</a:t>
             </a:fld>
             <a:endParaRPr lang="hu-HU"/>
           </a:p>
@@ -3016,7 +3021,7 @@
           <a:p>
             <a:fld id="{F83CE540-5687-412F-83D3-2D1A385E2057}" type="datetimeFigureOut">
               <a:rPr lang="hu-HU" smtClean="0"/>
-              <a:t>2021. 04. 13.</a:t>
+              <a:t>2021. 04. 14.</a:t>
             </a:fld>
             <a:endParaRPr lang="hu-HU"/>
           </a:p>
@@ -3196,7 +3201,7 @@
           <a:p>
             <a:fld id="{F83CE540-5687-412F-83D3-2D1A385E2057}" type="datetimeFigureOut">
               <a:rPr lang="hu-HU" smtClean="0"/>
-              <a:t>2021. 04. 13.</a:t>
+              <a:t>2021. 04. 14.</a:t>
             </a:fld>
             <a:endParaRPr lang="hu-HU"/>
           </a:p>
@@ -3366,7 +3371,7 @@
           <a:p>
             <a:fld id="{F83CE540-5687-412F-83D3-2D1A385E2057}" type="datetimeFigureOut">
               <a:rPr lang="hu-HU" smtClean="0"/>
-              <a:t>2021. 04. 13.</a:t>
+              <a:t>2021. 04. 14.</a:t>
             </a:fld>
             <a:endParaRPr lang="hu-HU"/>
           </a:p>
@@ -3623,7 +3628,7 @@
           <a:p>
             <a:fld id="{F83CE540-5687-412F-83D3-2D1A385E2057}" type="datetimeFigureOut">
               <a:rPr lang="hu-HU" smtClean="0"/>
-              <a:t>2021. 04. 13.</a:t>
+              <a:t>2021. 04. 14.</a:t>
             </a:fld>
             <a:endParaRPr lang="hu-HU"/>
           </a:p>
@@ -3855,7 +3860,7 @@
           <a:p>
             <a:fld id="{F83CE540-5687-412F-83D3-2D1A385E2057}" type="datetimeFigureOut">
               <a:rPr lang="hu-HU" smtClean="0"/>
-              <a:t>2021. 04. 13.</a:t>
+              <a:t>2021. 04. 14.</a:t>
             </a:fld>
             <a:endParaRPr lang="hu-HU"/>
           </a:p>
@@ -4248,7 +4253,7 @@
           <a:p>
             <a:fld id="{F83CE540-5687-412F-83D3-2D1A385E2057}" type="datetimeFigureOut">
               <a:rPr lang="hu-HU" smtClean="0"/>
-              <a:t>2021. 04. 13.</a:t>
+              <a:t>2021. 04. 14.</a:t>
             </a:fld>
             <a:endParaRPr lang="hu-HU"/>
           </a:p>
@@ -4366,7 +4371,7 @@
           <a:p>
             <a:fld id="{F83CE540-5687-412F-83D3-2D1A385E2057}" type="datetimeFigureOut">
               <a:rPr lang="hu-HU" smtClean="0"/>
-              <a:t>2021. 04. 13.</a:t>
+              <a:t>2021. 04. 14.</a:t>
             </a:fld>
             <a:endParaRPr lang="hu-HU"/>
           </a:p>
@@ -4461,7 +4466,7 @@
           <a:p>
             <a:fld id="{F83CE540-5687-412F-83D3-2D1A385E2057}" type="datetimeFigureOut">
               <a:rPr lang="hu-HU" smtClean="0"/>
-              <a:t>2021. 04. 13.</a:t>
+              <a:t>2021. 04. 14.</a:t>
             </a:fld>
             <a:endParaRPr lang="hu-HU"/>
           </a:p>
@@ -4734,7 +4739,7 @@
           <a:p>
             <a:fld id="{F83CE540-5687-412F-83D3-2D1A385E2057}" type="datetimeFigureOut">
               <a:rPr lang="hu-HU" smtClean="0"/>
-              <a:t>2021. 04. 13.</a:t>
+              <a:t>2021. 04. 14.</a:t>
             </a:fld>
             <a:endParaRPr lang="hu-HU"/>
           </a:p>
@@ -5015,7 +5020,7 @@
           <a:p>
             <a:fld id="{F83CE540-5687-412F-83D3-2D1A385E2057}" type="datetimeFigureOut">
               <a:rPr lang="hu-HU" smtClean="0"/>
-              <a:t>2021. 04. 13.</a:t>
+              <a:t>2021. 04. 14.</a:t>
             </a:fld>
             <a:endParaRPr lang="hu-HU"/>
           </a:p>
@@ -5255,7 +5260,7 @@
           <a:p>
             <a:fld id="{F83CE540-5687-412F-83D3-2D1A385E2057}" type="datetimeFigureOut">
               <a:rPr lang="hu-HU" smtClean="0"/>
-              <a:t>2021. 04. 13.</a:t>
+              <a:t>2021. 04. 14.</a:t>
             </a:fld>
             <a:endParaRPr lang="hu-HU"/>
           </a:p>
@@ -6065,12 +6070,16 @@
               <a:buChar char="•"/>
             </a:pPr>
             <a:r>
-              <a:rPr lang="en-US" sz="2400" dirty="0" smtClean="0"/>
+              <a:rPr lang="en-US" sz="2400" smtClean="0"/>
               <a:t>Was </a:t>
             </a:r>
             <a:r>
+              <a:rPr lang="en-US" sz="2400" smtClean="0"/>
+              <a:t>it </a:t>
+            </a:r>
+            <a:r>
               <a:rPr lang="en-US" sz="2400" dirty="0"/>
-              <a:t>is it useful</a:t>
+              <a:t>useful</a:t>
             </a:r>
             <a:r>
               <a:rPr lang="en-US" sz="2400" dirty="0" smtClean="0"/>

</xml_diff>